<commit_message>
edited database and GUI forms
</commit_message>
<xml_diff>
--- a/livestock inventory control system.pptx
+++ b/livestock inventory control system.pptx
@@ -346,7 +346,7 @@
           <a:p>
             <a:fld id="{8EA8EAB4-E0C0-4B1E-ADE8-6797E43D2A06}" type="datetimeFigureOut">
               <a:rPr lang="en-US" smtClean="0"/>
-              <a:t>5/11/2025</a:t>
+              <a:t>5/12/2025</a:t>
             </a:fld>
             <a:endParaRPr lang="en-US"/>
           </a:p>
@@ -554,7 +554,7 @@
           <a:p>
             <a:fld id="{8EA8EAB4-E0C0-4B1E-ADE8-6797E43D2A06}" type="datetimeFigureOut">
               <a:rPr lang="en-US" smtClean="0"/>
-              <a:t>5/11/2025</a:t>
+              <a:t>5/12/2025</a:t>
             </a:fld>
             <a:endParaRPr lang="en-US"/>
           </a:p>
@@ -810,7 +810,7 @@
           <a:p>
             <a:fld id="{8EA8EAB4-E0C0-4B1E-ADE8-6797E43D2A06}" type="datetimeFigureOut">
               <a:rPr lang="en-US" smtClean="0"/>
-              <a:t>5/11/2025</a:t>
+              <a:t>5/12/2025</a:t>
             </a:fld>
             <a:endParaRPr lang="en-US"/>
           </a:p>
@@ -984,7 +984,7 @@
           <a:p>
             <a:fld id="{8EA8EAB4-E0C0-4B1E-ADE8-6797E43D2A06}" type="datetimeFigureOut">
               <a:rPr lang="en-US" smtClean="0"/>
-              <a:t>5/11/2025</a:t>
+              <a:t>5/12/2025</a:t>
             </a:fld>
             <a:endParaRPr lang="en-US"/>
           </a:p>
@@ -1327,7 +1327,7 @@
           <a:p>
             <a:fld id="{8EA8EAB4-E0C0-4B1E-ADE8-6797E43D2A06}" type="datetimeFigureOut">
               <a:rPr lang="en-US" smtClean="0"/>
-              <a:t>5/11/2025</a:t>
+              <a:t>5/12/2025</a:t>
             </a:fld>
             <a:endParaRPr lang="en-US"/>
           </a:p>
@@ -1602,7 +1602,7 @@
           <a:p>
             <a:fld id="{8EA8EAB4-E0C0-4B1E-ADE8-6797E43D2A06}" type="datetimeFigureOut">
               <a:rPr lang="en-US" smtClean="0"/>
-              <a:t>5/11/2025</a:t>
+              <a:t>5/12/2025</a:t>
             </a:fld>
             <a:endParaRPr lang="en-US"/>
           </a:p>
@@ -1981,7 +1981,7 @@
           <a:p>
             <a:fld id="{8EA8EAB4-E0C0-4B1E-ADE8-6797E43D2A06}" type="datetimeFigureOut">
               <a:rPr lang="en-US" smtClean="0"/>
-              <a:t>5/11/2025</a:t>
+              <a:t>5/12/2025</a:t>
             </a:fld>
             <a:endParaRPr lang="en-US"/>
           </a:p>
@@ -2099,7 +2099,7 @@
           <a:p>
             <a:fld id="{8EA8EAB4-E0C0-4B1E-ADE8-6797E43D2A06}" type="datetimeFigureOut">
               <a:rPr lang="en-US" smtClean="0"/>
-              <a:t>5/11/2025</a:t>
+              <a:t>5/12/2025</a:t>
             </a:fld>
             <a:endParaRPr lang="en-US"/>
           </a:p>
@@ -2270,7 +2270,7 @@
           <a:p>
             <a:fld id="{8EA8EAB4-E0C0-4B1E-ADE8-6797E43D2A06}" type="datetimeFigureOut">
               <a:rPr lang="en-US" smtClean="0"/>
-              <a:t>5/11/2025</a:t>
+              <a:t>5/12/2025</a:t>
             </a:fld>
             <a:endParaRPr lang="en-US"/>
           </a:p>
@@ -2624,7 +2624,7 @@
           <a:p>
             <a:fld id="{8EA8EAB4-E0C0-4B1E-ADE8-6797E43D2A06}" type="datetimeFigureOut">
               <a:rPr lang="en-US" smtClean="0"/>
-              <a:t>5/11/2025</a:t>
+              <a:t>5/12/2025</a:t>
             </a:fld>
             <a:endParaRPr lang="en-US"/>
           </a:p>
@@ -3006,7 +3006,7 @@
           <a:p>
             <a:fld id="{8EA8EAB4-E0C0-4B1E-ADE8-6797E43D2A06}" type="datetimeFigureOut">
               <a:rPr lang="en-US" smtClean="0"/>
-              <a:t>5/11/2025</a:t>
+              <a:t>5/12/2025</a:t>
             </a:fld>
             <a:endParaRPr lang="en-US"/>
           </a:p>
@@ -3293,7 +3293,7 @@
           <a:p>
             <a:fld id="{8EA8EAB4-E0C0-4B1E-ADE8-6797E43D2A06}" type="datetimeFigureOut">
               <a:rPr lang="en-US" smtClean="0"/>
-              <a:t>5/11/2025</a:t>
+              <a:t>5/12/2025</a:t>
             </a:fld>
             <a:endParaRPr lang="en-US"/>
           </a:p>
@@ -3840,11 +3840,7 @@
             </a:r>
             <a:r>
               <a:rPr lang="en-US" dirty="0" smtClean="0"/>
-              <a:t> INVENTORY </a:t>
-            </a:r>
-            <a:r>
-              <a:rPr lang="en-US" dirty="0" smtClean="0"/>
-              <a:t>CONTROL SYSTEM</a:t>
+              <a:t> INVENTORY CONTROL SYSTEM</a:t>
             </a:r>
             <a:endParaRPr lang="en-US" dirty="0"/>
           </a:p>
@@ -4359,21 +4355,13 @@
           <a:p>
             <a:r>
               <a:rPr lang="en-US" dirty="0" smtClean="0"/>
-              <a:t>Supports different windows to display livestock records, generated reports, finance records and calculations, and daily events</a:t>
-            </a:r>
-            <a:r>
-              <a:rPr lang="en-US" dirty="0" smtClean="0"/>
-              <a:t>.</a:t>
+              <a:t>Supports different windows to display livestock records, generated reports, finance records and calculations, and daily events.</a:t>
             </a:r>
           </a:p>
           <a:p>
             <a:r>
               <a:rPr lang="en-GB" dirty="0" smtClean="0"/>
-              <a:t>Displays inventory status and </a:t>
-            </a:r>
-            <a:r>
-              <a:rPr lang="en-GB" dirty="0" smtClean="0"/>
-              <a:t>other attributes. </a:t>
+              <a:t>Displays inventory status and other attributes. </a:t>
             </a:r>
           </a:p>
           <a:p>
@@ -4684,16 +4672,10 @@
           </a:p>
           <a:p>
             <a:r>
-              <a:rPr lang="en-US" dirty="0" smtClean="0"/>
-              <a:t>https</a:t>
-            </a:r>
-            <a:r>
-              <a:rPr lang="en-US" dirty="0"/>
-              <a:t>://</a:t>
-            </a:r>
-            <a:r>
-              <a:rPr lang="en-US" dirty="0" smtClean="0"/>
-              <a:t>github.com/ntatayamiko/inventory.</a:t>
+              <a:rPr lang="en-US" dirty="0" smtClean="0">
+                <a:hlinkClick r:id="rId2"/>
+              </a:rPr>
+              <a:t>https://github.com/ntatayamiko/inventory</a:t>
             </a:r>
             <a:endParaRPr lang="en-US" dirty="0" smtClean="0"/>
           </a:p>

</xml_diff>